<commit_message>
Admin add users to event (#162)
* mock

* Merge master

* Corrected instruction

* Add radiobutton group for RegistrationStatus

* Only allow registrations of existing users

* Changed from registrationstatus to type

* Use the selected users id, not display text

* Get registration to work.

* Redirect to the events page after adding the registration.
</commit_message>
<xml_diff>
--- a/docs/Specification/Specification.pptx
+++ b/docs/Specification/Specification.pptx
@@ -5,14 +5,12 @@
     <p:sldMasterId id="2147484329" r:id="rId1"/>
   </p:sldMasterIdLst>
   <p:notesMasterIdLst>
-    <p:notesMasterId r:id="rId7"/>
+    <p:notesMasterId r:id="rId5"/>
   </p:notesMasterIdLst>
   <p:sldIdLst>
     <p:sldId id="261" r:id="rId2"/>
-    <p:sldId id="264" r:id="rId3"/>
-    <p:sldId id="265" r:id="rId4"/>
-    <p:sldId id="266" r:id="rId5"/>
-    <p:sldId id="263" r:id="rId6"/>
+    <p:sldId id="262" r:id="rId3"/>
+    <p:sldId id="263" r:id="rId4"/>
   </p:sldIdLst>
   <p:sldSz cx="12192000" cy="6858000"/>
   <p:notesSz cx="6858000" cy="9144000"/>
@@ -201,7 +199,7 @@
           <a:p>
             <a:fld id="{7D3704E5-EE6C-6543-B967-756166BADC24}" type="datetimeFigureOut">
               <a:rPr lang="nb-NO" smtClean="0"/>
-              <a:t>01.05.2018</a:t>
+              <a:t>30.04.2018</a:t>
             </a:fld>
             <a:endParaRPr lang="nb-NO"/>
           </a:p>
@@ -3440,64 +3438,47 @@
       </p:grpSpPr>
       <p:sp>
         <p:nvSpPr>
-          <p:cNvPr id="8" name="Rektangel 7">
+          <p:cNvPr id="2" name="Tittel 1">
             <a:extLst>
               <a:ext uri="{FF2B5EF4-FFF2-40B4-BE49-F238E27FC236}">
-                <a16:creationId xmlns:a16="http://schemas.microsoft.com/office/drawing/2014/main" id="{A39C433E-7A42-0548-BBF3-EEBFBD112BCF}"/>
+                <a16:creationId xmlns:a16="http://schemas.microsoft.com/office/drawing/2014/main" id="{665654FF-19C8-1043-BA18-F41138BCD1CA}"/>
               </a:ext>
             </a:extLst>
           </p:cNvPr>
-          <p:cNvSpPr/>
-          <p:nvPr/>
-        </p:nvSpPr>
-        <p:spPr>
-          <a:xfrm>
-            <a:off x="1195614" y="3676106"/>
-            <a:ext cx="8441872" cy="2767820"/>
-          </a:xfrm>
-          <a:prstGeom prst="rect">
-            <a:avLst/>
-          </a:prstGeom>
-          <a:solidFill>
-            <a:schemeClr val="bg2"/>
-          </a:solidFill>
-        </p:spPr>
-        <p:style>
-          <a:lnRef idx="1">
-            <a:schemeClr val="accent4"/>
-          </a:lnRef>
-          <a:fillRef idx="2">
-            <a:schemeClr val="accent4"/>
-          </a:fillRef>
-          <a:effectRef idx="1">
-            <a:schemeClr val="accent4"/>
-          </a:effectRef>
-          <a:fontRef idx="minor">
-            <a:schemeClr val="dk1"/>
-          </a:fontRef>
-        </p:style>
-        <p:txBody>
-          <a:bodyPr rtlCol="0" anchor="t" anchorCtr="0"/>
+          <p:cNvSpPr>
+            <a:spLocks noGrp="1"/>
+          </p:cNvSpPr>
+          <p:nvPr>
+            <p:ph type="title"/>
+          </p:nvPr>
+        </p:nvSpPr>
+        <p:spPr/>
+        <p:txBody>
+          <a:bodyPr/>
           <a:lstStyle/>
           <a:p>
-            <a:pPr algn="ctr"/>
             <a:r>
               <a:rPr lang="nb-NO" dirty="0" err="1"/>
-              <a:t>Participants</a:t>
+              <a:t>Registration</a:t>
             </a:r>
             <a:r>
               <a:rPr lang="nb-NO" dirty="0"/>
-              <a:t>  part</a:t>
-            </a:r>
-          </a:p>
-        </p:txBody>
-      </p:sp>
-      <p:sp>
-        <p:nvSpPr>
-          <p:cNvPr id="2" name="Tittel 1">
+              <a:t> </a:t>
+            </a:r>
+            <a:r>
+              <a:rPr lang="nb-NO" dirty="0" err="1"/>
+              <a:t>options</a:t>
+            </a:r>
+            <a:endParaRPr lang="nb-NO" dirty="0"/>
+          </a:p>
+        </p:txBody>
+      </p:sp>
+      <p:sp>
+        <p:nvSpPr>
+          <p:cNvPr id="3" name="Plassholder for innhold 2">
             <a:extLst>
               <a:ext uri="{FF2B5EF4-FFF2-40B4-BE49-F238E27FC236}">
-                <a16:creationId xmlns:a16="http://schemas.microsoft.com/office/drawing/2014/main" id="{0870221B-2317-F640-8289-B92F2802F106}"/>
+                <a16:creationId xmlns:a16="http://schemas.microsoft.com/office/drawing/2014/main" id="{3A5615BE-65E3-B844-BE9A-6BDD7BBCB556}"/>
               </a:ext>
             </a:extLst>
           </p:cNvPr>
@@ -3505,24 +3486,21 @@
             <a:spLocks noGrp="1"/>
           </p:cNvSpPr>
           <p:nvPr>
-            <p:ph type="title"/>
-          </p:nvPr>
-        </p:nvSpPr>
-        <p:spPr>
-          <a:xfrm>
-            <a:off x="979714" y="57567"/>
-            <a:ext cx="9144001" cy="1188720"/>
-          </a:xfrm>
-        </p:spPr>
-        <p:txBody>
-          <a:bodyPr>
-            <a:normAutofit/>
-          </a:bodyPr>
+            <p:ph idx="1"/>
+          </p:nvPr>
+        </p:nvSpPr>
+        <p:spPr/>
+        <p:txBody>
+          <a:bodyPr/>
           <a:lstStyle/>
           <a:p>
             <a:r>
+              <a:rPr lang="nb-NO" dirty="0"/>
+              <a:t>Products, </a:t>
+            </a:r>
+            <a:r>
               <a:rPr lang="nb-NO" dirty="0" err="1"/>
-              <a:t>Event</a:t>
+              <a:t>eventually</a:t>
             </a:r>
             <a:r>
               <a:rPr lang="nb-NO" dirty="0"/>
@@ -3530,7 +3508,39 @@
             </a:r>
             <a:r>
               <a:rPr lang="nb-NO" dirty="0" err="1"/>
-              <a:t>admin</a:t>
+              <a:t>with</a:t>
+            </a:r>
+            <a:r>
+              <a:rPr lang="nb-NO" dirty="0"/>
+              <a:t> variants</a:t>
+            </a:r>
+          </a:p>
+          <a:p>
+            <a:r>
+              <a:rPr lang="nb-NO" dirty="0" err="1"/>
+              <a:t>Quantity</a:t>
+            </a:r>
+            <a:endParaRPr lang="nb-NO" dirty="0"/>
+          </a:p>
+          <a:p>
+            <a:endParaRPr lang="nb-NO" dirty="0"/>
+          </a:p>
+          <a:p>
+            <a:endParaRPr lang="nb-NO" dirty="0"/>
+          </a:p>
+          <a:p>
+            <a:pPr marL="0" indent="0">
+              <a:buNone/>
+            </a:pPr>
+            <a:r>
+              <a:rPr lang="nb-NO" dirty="0"/>
+              <a:t>Later</a:t>
+            </a:r>
+          </a:p>
+          <a:p>
+            <a:r>
+              <a:rPr lang="nb-NO" dirty="0" err="1"/>
+              <a:t>Custom</a:t>
             </a:r>
             <a:r>
               <a:rPr lang="nb-NO" dirty="0"/>
@@ -3538,246 +3548,15 @@
             </a:r>
             <a:r>
               <a:rPr lang="nb-NO" dirty="0" err="1"/>
-              <a:t>main</a:t>
+              <a:t>fields</a:t>
             </a:r>
             <a:r>
               <a:rPr lang="nb-NO" dirty="0"/>
-              <a:t> </a:t>
+              <a:t> – </a:t>
             </a:r>
             <a:r>
               <a:rPr lang="nb-NO" dirty="0" err="1"/>
-              <a:t>page</a:t>
-            </a:r>
-            <a:br>
-              <a:rPr lang="nb-NO" dirty="0"/>
-            </a:br>
-            <a:r>
-              <a:rPr lang="nb-NO" sz="2000" dirty="0"/>
-              <a:t>/</a:t>
-            </a:r>
-            <a:r>
-              <a:rPr lang="nb-NO" sz="2000" dirty="0" err="1"/>
-              <a:t>Admin</a:t>
-            </a:r>
-            <a:r>
-              <a:rPr lang="nb-NO" sz="2000" dirty="0"/>
-              <a:t>/EVENTS/x/</a:t>
-            </a:r>
-            <a:r>
-              <a:rPr lang="nb-NO" sz="2000" dirty="0" err="1"/>
-              <a:t>Details</a:t>
-            </a:r>
-            <a:endParaRPr lang="nb-NO" dirty="0"/>
-          </a:p>
-        </p:txBody>
-      </p:sp>
-      <p:sp>
-        <p:nvSpPr>
-          <p:cNvPr id="4" name="Rektangel 3">
-            <a:extLst>
-              <a:ext uri="{FF2B5EF4-FFF2-40B4-BE49-F238E27FC236}">
-                <a16:creationId xmlns:a16="http://schemas.microsoft.com/office/drawing/2014/main" id="{362D08EC-1361-DF4E-A182-A2B708880686}"/>
-              </a:ext>
-            </a:extLst>
-          </p:cNvPr>
-          <p:cNvSpPr/>
-          <p:nvPr/>
-        </p:nvSpPr>
-        <p:spPr>
-          <a:xfrm>
-            <a:off x="979714" y="1379637"/>
-            <a:ext cx="8441872" cy="841049"/>
-          </a:xfrm>
-          <a:prstGeom prst="rect">
-            <a:avLst/>
-          </a:prstGeom>
-        </p:spPr>
-        <p:style>
-          <a:lnRef idx="2">
-            <a:schemeClr val="accent1">
-              <a:shade val="50000"/>
-            </a:schemeClr>
-          </a:lnRef>
-          <a:fillRef idx="1">
-            <a:schemeClr val="accent1"/>
-          </a:fillRef>
-          <a:effectRef idx="0">
-            <a:schemeClr val="accent1"/>
-          </a:effectRef>
-          <a:fontRef idx="minor">
-            <a:schemeClr val="lt1"/>
-          </a:fontRef>
-        </p:style>
-        <p:txBody>
-          <a:bodyPr rtlCol="0" anchor="ctr"/>
-          <a:lstStyle/>
-          <a:p>
-            <a:pPr algn="ctr"/>
-            <a:r>
-              <a:rPr lang="nb-NO" dirty="0"/>
-              <a:t>Info part</a:t>
-            </a:r>
-          </a:p>
-        </p:txBody>
-      </p:sp>
-      <p:sp>
-        <p:nvSpPr>
-          <p:cNvPr id="5" name="Rektangel 4">
-            <a:extLst>
-              <a:ext uri="{FF2B5EF4-FFF2-40B4-BE49-F238E27FC236}">
-                <a16:creationId xmlns:a16="http://schemas.microsoft.com/office/drawing/2014/main" id="{32483EE9-FD47-3745-B6E9-4510F9F34CB3}"/>
-              </a:ext>
-            </a:extLst>
-          </p:cNvPr>
-          <p:cNvSpPr/>
-          <p:nvPr/>
-        </p:nvSpPr>
-        <p:spPr>
-          <a:xfrm>
-            <a:off x="979714" y="2261380"/>
-            <a:ext cx="8441872" cy="841049"/>
-          </a:xfrm>
-          <a:prstGeom prst="rect">
-            <a:avLst/>
-          </a:prstGeom>
-        </p:spPr>
-        <p:style>
-          <a:lnRef idx="2">
-            <a:schemeClr val="accent1">
-              <a:shade val="50000"/>
-            </a:schemeClr>
-          </a:lnRef>
-          <a:fillRef idx="1">
-            <a:schemeClr val="accent1"/>
-          </a:fillRef>
-          <a:effectRef idx="0">
-            <a:schemeClr val="accent1"/>
-          </a:effectRef>
-          <a:fontRef idx="minor">
-            <a:schemeClr val="lt1"/>
-          </a:fontRef>
-        </p:style>
-        <p:txBody>
-          <a:bodyPr rtlCol="0" anchor="ctr"/>
-          <a:lstStyle/>
-          <a:p>
-            <a:pPr algn="ctr"/>
-            <a:r>
-              <a:rPr lang="nb-NO" dirty="0"/>
-              <a:t>Menu  part</a:t>
-            </a:r>
-          </a:p>
-        </p:txBody>
-      </p:sp>
-      <p:sp>
-        <p:nvSpPr>
-          <p:cNvPr id="6" name="Rektangel 5">
-            <a:extLst>
-              <a:ext uri="{FF2B5EF4-FFF2-40B4-BE49-F238E27FC236}">
-                <a16:creationId xmlns:a16="http://schemas.microsoft.com/office/drawing/2014/main" id="{994A9658-F5E4-1B44-AF39-972CC8F08842}"/>
-              </a:ext>
-            </a:extLst>
-          </p:cNvPr>
-          <p:cNvSpPr/>
-          <p:nvPr/>
-        </p:nvSpPr>
-        <p:spPr>
-          <a:xfrm>
-            <a:off x="979714" y="3409406"/>
-            <a:ext cx="8441872" cy="2767820"/>
-          </a:xfrm>
-          <a:prstGeom prst="rect">
-            <a:avLst/>
-          </a:prstGeom>
-          <a:solidFill>
-            <a:schemeClr val="bg2"/>
-          </a:solidFill>
-        </p:spPr>
-        <p:style>
-          <a:lnRef idx="1">
-            <a:schemeClr val="accent4"/>
-          </a:lnRef>
-          <a:fillRef idx="2">
-            <a:schemeClr val="accent4"/>
-          </a:fillRef>
-          <a:effectRef idx="1">
-            <a:schemeClr val="accent4"/>
-          </a:effectRef>
-          <a:fontRef idx="minor">
-            <a:schemeClr val="dk1"/>
-          </a:fontRef>
-        </p:style>
-        <p:txBody>
-          <a:bodyPr rtlCol="0" anchor="t" anchorCtr="0"/>
-          <a:lstStyle/>
-          <a:p>
-            <a:pPr algn="ctr"/>
-            <a:r>
-              <a:rPr lang="nb-NO" dirty="0"/>
-              <a:t>For </a:t>
-            </a:r>
-            <a:r>
-              <a:rPr lang="nb-NO" dirty="0" err="1"/>
-              <a:t>each</a:t>
-            </a:r>
-            <a:r>
-              <a:rPr lang="nb-NO" dirty="0"/>
-              <a:t> </a:t>
-            </a:r>
-            <a:r>
-              <a:rPr lang="nb-NO" dirty="0" err="1"/>
-              <a:t>participant</a:t>
-            </a:r>
-            <a:endParaRPr lang="nb-NO" dirty="0"/>
-          </a:p>
-        </p:txBody>
-      </p:sp>
-      <p:sp>
-        <p:nvSpPr>
-          <p:cNvPr id="7" name="Rektangel 6">
-            <a:extLst>
-              <a:ext uri="{FF2B5EF4-FFF2-40B4-BE49-F238E27FC236}">
-                <a16:creationId xmlns:a16="http://schemas.microsoft.com/office/drawing/2014/main" id="{1941FCF1-B25A-AD4C-9D94-16287FDEFA31}"/>
-              </a:ext>
-            </a:extLst>
-          </p:cNvPr>
-          <p:cNvSpPr/>
-          <p:nvPr/>
-        </p:nvSpPr>
-        <p:spPr>
-          <a:xfrm>
-            <a:off x="1193800" y="3900297"/>
-            <a:ext cx="2070100" cy="1130403"/>
-          </a:xfrm>
-          <a:prstGeom prst="rect">
-            <a:avLst/>
-          </a:prstGeom>
-          <a:solidFill>
-            <a:schemeClr val="bg2"/>
-          </a:solidFill>
-        </p:spPr>
-        <p:style>
-          <a:lnRef idx="1">
-            <a:schemeClr val="accent4"/>
-          </a:lnRef>
-          <a:fillRef idx="2">
-            <a:schemeClr val="accent4"/>
-          </a:fillRef>
-          <a:effectRef idx="1">
-            <a:schemeClr val="accent4"/>
-          </a:effectRef>
-          <a:fontRef idx="minor">
-            <a:schemeClr val="dk1"/>
-          </a:fontRef>
-        </p:style>
-        <p:txBody>
-          <a:bodyPr rtlCol="0" anchor="t" anchorCtr="0"/>
-          <a:lstStyle/>
-          <a:p>
-            <a:pPr algn="ctr"/>
-            <a:r>
-              <a:rPr lang="nb-NO" dirty="0" err="1"/>
-              <a:t>Name</a:t>
+              <a:t>strings</a:t>
             </a:r>
             <a:r>
               <a:rPr lang="nb-NO" dirty="0"/>
@@ -3785,314 +3564,23 @@
             </a:r>
             <a:r>
               <a:rPr lang="nb-NO" dirty="0" err="1"/>
-              <a:t>contact</a:t>
+              <a:t>selectbox</a:t>
             </a:r>
             <a:r>
               <a:rPr lang="nb-NO" dirty="0"/>
-              <a:t> info, </a:t>
+              <a:t>, </a:t>
             </a:r>
             <a:r>
               <a:rPr lang="nb-NO" dirty="0" err="1"/>
-              <a:t>user</a:t>
+              <a:t>radioes</a:t>
             </a:r>
             <a:r>
               <a:rPr lang="nb-NO" dirty="0"/>
-              <a:t> </a:t>
+              <a:t>, </a:t>
             </a:r>
             <a:r>
               <a:rPr lang="nb-NO" dirty="0" err="1"/>
-              <a:t>details</a:t>
-            </a:r>
-            <a:endParaRPr lang="nb-NO" dirty="0"/>
-          </a:p>
-        </p:txBody>
-      </p:sp>
-      <p:sp>
-        <p:nvSpPr>
-          <p:cNvPr id="9" name="Rektangel 8">
-            <a:extLst>
-              <a:ext uri="{FF2B5EF4-FFF2-40B4-BE49-F238E27FC236}">
-                <a16:creationId xmlns:a16="http://schemas.microsoft.com/office/drawing/2014/main" id="{0525B64B-9E36-5142-B6C7-C927F29BAA34}"/>
-              </a:ext>
-            </a:extLst>
-          </p:cNvPr>
-          <p:cNvSpPr/>
-          <p:nvPr/>
-        </p:nvSpPr>
-        <p:spPr>
-          <a:xfrm>
-            <a:off x="3479800" y="3900297"/>
-            <a:ext cx="2870200" cy="1968500"/>
-          </a:xfrm>
-          <a:prstGeom prst="rect">
-            <a:avLst/>
-          </a:prstGeom>
-          <a:solidFill>
-            <a:schemeClr val="bg2"/>
-          </a:solidFill>
-        </p:spPr>
-        <p:style>
-          <a:lnRef idx="1">
-            <a:schemeClr val="accent4"/>
-          </a:lnRef>
-          <a:fillRef idx="2">
-            <a:schemeClr val="accent4"/>
-          </a:fillRef>
-          <a:effectRef idx="1">
-            <a:schemeClr val="accent4"/>
-          </a:effectRef>
-          <a:fontRef idx="minor">
-            <a:schemeClr val="dk1"/>
-          </a:fontRef>
-        </p:style>
-        <p:txBody>
-          <a:bodyPr rtlCol="0" anchor="t" anchorCtr="0"/>
-          <a:lstStyle/>
-          <a:p>
-            <a:pPr algn="ctr"/>
-            <a:r>
-              <a:rPr lang="nb-NO" dirty="0" err="1"/>
-              <a:t>Current</a:t>
-            </a:r>
-            <a:r>
-              <a:rPr lang="nb-NO" dirty="0"/>
-              <a:t> </a:t>
-            </a:r>
-            <a:r>
-              <a:rPr lang="nb-NO" dirty="0" err="1"/>
-              <a:t>ordered</a:t>
-            </a:r>
-            <a:r>
-              <a:rPr lang="nb-NO" dirty="0"/>
-              <a:t> </a:t>
-            </a:r>
-            <a:r>
-              <a:rPr lang="nb-NO" dirty="0" err="1"/>
-              <a:t>products</a:t>
-            </a:r>
-            <a:endParaRPr lang="nb-NO" dirty="0"/>
-          </a:p>
-          <a:p>
-            <a:pPr marL="285750" indent="-285750" algn="ctr">
-              <a:buFont typeface="Arial" panose="020B0604020202020204" pitchFamily="34" charset="0"/>
-              <a:buChar char="•"/>
-            </a:pPr>
-            <a:r>
-              <a:rPr lang="nb-NO" dirty="0"/>
-              <a:t>Product A</a:t>
-            </a:r>
-          </a:p>
-          <a:p>
-            <a:pPr marL="285750" indent="-285750" algn="ctr">
-              <a:buFont typeface="Arial" panose="020B0604020202020204" pitchFamily="34" charset="0"/>
-              <a:buChar char="•"/>
-            </a:pPr>
-            <a:r>
-              <a:rPr lang="nb-NO" dirty="0"/>
-              <a:t>Product B, variant 1</a:t>
-            </a:r>
-          </a:p>
-        </p:txBody>
-      </p:sp>
-      <p:sp>
-        <p:nvSpPr>
-          <p:cNvPr id="10" name="Rektangel 9">
-            <a:extLst>
-              <a:ext uri="{FF2B5EF4-FFF2-40B4-BE49-F238E27FC236}">
-                <a16:creationId xmlns:a16="http://schemas.microsoft.com/office/drawing/2014/main" id="{24E0008A-1AC3-E445-8450-BE22C15D6AD2}"/>
-              </a:ext>
-            </a:extLst>
-          </p:cNvPr>
-          <p:cNvSpPr/>
-          <p:nvPr/>
-        </p:nvSpPr>
-        <p:spPr>
-          <a:xfrm>
-            <a:off x="3867150" y="5037533"/>
-            <a:ext cx="2095500" cy="831264"/>
-          </a:xfrm>
-          <a:prstGeom prst="rect">
-            <a:avLst/>
-          </a:prstGeom>
-          <a:solidFill>
-            <a:schemeClr val="accent5"/>
-          </a:solidFill>
-        </p:spPr>
-        <p:style>
-          <a:lnRef idx="1">
-            <a:schemeClr val="accent4"/>
-          </a:lnRef>
-          <a:fillRef idx="2">
-            <a:schemeClr val="accent4"/>
-          </a:fillRef>
-          <a:effectRef idx="1">
-            <a:schemeClr val="accent4"/>
-          </a:effectRef>
-          <a:fontRef idx="minor">
-            <a:schemeClr val="dk1"/>
-          </a:fontRef>
-        </p:style>
-        <p:txBody>
-          <a:bodyPr rtlCol="0" anchor="t" anchorCtr="0"/>
-          <a:lstStyle/>
-          <a:p>
-            <a:pPr algn="ctr"/>
-            <a:r>
-              <a:rPr lang="nb-NO" sz="1400" dirty="0" err="1"/>
-              <a:t>Change</a:t>
-            </a:r>
-            <a:r>
-              <a:rPr lang="nb-NO" sz="1400" dirty="0"/>
-              <a:t> </a:t>
-            </a:r>
-            <a:r>
-              <a:rPr lang="nb-NO" sz="1400" dirty="0" err="1"/>
-              <a:t>products</a:t>
-            </a:r>
-            <a:r>
-              <a:rPr lang="nb-NO" sz="1400" dirty="0"/>
-              <a:t> </a:t>
-            </a:r>
-            <a:r>
-              <a:rPr lang="nb-NO" sz="1400" dirty="0" err="1"/>
-              <a:t>button</a:t>
-            </a:r>
-            <a:r>
-              <a:rPr lang="nb-NO" sz="1400" dirty="0"/>
-              <a:t> (</a:t>
-            </a:r>
-            <a:r>
-              <a:rPr lang="nb-NO" sz="1400" dirty="0" err="1"/>
-              <a:t>opens</a:t>
-            </a:r>
-            <a:r>
-              <a:rPr lang="nb-NO" sz="1400" dirty="0"/>
-              <a:t> modal </a:t>
-            </a:r>
-            <a:r>
-              <a:rPr lang="nb-NO" sz="1400" dirty="0" err="1"/>
-              <a:t>shown</a:t>
-            </a:r>
-            <a:r>
-              <a:rPr lang="nb-NO" sz="1400" dirty="0"/>
-              <a:t> </a:t>
-            </a:r>
-            <a:r>
-              <a:rPr lang="nb-NO" sz="1400" dirty="0" err="1"/>
-              <a:t>on</a:t>
-            </a:r>
-            <a:r>
-              <a:rPr lang="nb-NO" sz="1400" dirty="0"/>
-              <a:t> </a:t>
-            </a:r>
-            <a:r>
-              <a:rPr lang="nb-NO" sz="1400" dirty="0" err="1"/>
-              <a:t>next</a:t>
-            </a:r>
-            <a:r>
-              <a:rPr lang="nb-NO" sz="1400" dirty="0"/>
-              <a:t> slide)</a:t>
-            </a:r>
-          </a:p>
-        </p:txBody>
-      </p:sp>
-      <p:sp>
-        <p:nvSpPr>
-          <p:cNvPr id="11" name="Rektangel 10">
-            <a:extLst>
-              <a:ext uri="{FF2B5EF4-FFF2-40B4-BE49-F238E27FC236}">
-                <a16:creationId xmlns:a16="http://schemas.microsoft.com/office/drawing/2014/main" id="{07EAB2C4-D5E8-6B44-9021-F224100C8FA3}"/>
-              </a:ext>
-            </a:extLst>
-          </p:cNvPr>
-          <p:cNvSpPr/>
-          <p:nvPr/>
-        </p:nvSpPr>
-        <p:spPr>
-          <a:xfrm>
-            <a:off x="6426200" y="3900297"/>
-            <a:ext cx="2870200" cy="1968500"/>
-          </a:xfrm>
-          <a:prstGeom prst="rect">
-            <a:avLst/>
-          </a:prstGeom>
-          <a:solidFill>
-            <a:schemeClr val="bg2"/>
-          </a:solidFill>
-        </p:spPr>
-        <p:style>
-          <a:lnRef idx="1">
-            <a:schemeClr val="accent4"/>
-          </a:lnRef>
-          <a:fillRef idx="2">
-            <a:schemeClr val="accent4"/>
-          </a:fillRef>
-          <a:effectRef idx="1">
-            <a:schemeClr val="accent4"/>
-          </a:effectRef>
-          <a:fontRef idx="minor">
-            <a:schemeClr val="dk1"/>
-          </a:fontRef>
-        </p:style>
-        <p:txBody>
-          <a:bodyPr rtlCol="0" anchor="t" anchorCtr="0"/>
-          <a:lstStyle/>
-          <a:p>
-            <a:pPr algn="ctr"/>
-            <a:r>
-              <a:rPr lang="nb-NO" dirty="0"/>
-              <a:t>Menu</a:t>
-            </a:r>
-          </a:p>
-          <a:p>
-            <a:pPr marL="285750" indent="-285750" algn="ctr">
-              <a:buFont typeface="Arial" panose="020B0604020202020204" pitchFamily="34" charset="0"/>
-              <a:buChar char="•"/>
-            </a:pPr>
-            <a:r>
-              <a:rPr lang="nb-NO" dirty="0"/>
-              <a:t>Show </a:t>
-            </a:r>
-            <a:r>
-              <a:rPr lang="nb-NO" dirty="0" err="1"/>
-              <a:t>registration</a:t>
-            </a:r>
-            <a:r>
-              <a:rPr lang="nb-NO" dirty="0"/>
-              <a:t> </a:t>
-            </a:r>
-            <a:r>
-              <a:rPr lang="nb-NO" dirty="0" err="1"/>
-              <a:t>page</a:t>
-            </a:r>
-            <a:endParaRPr lang="nb-NO" dirty="0"/>
-          </a:p>
-          <a:p>
-            <a:pPr marL="285750" indent="-285750" algn="ctr">
-              <a:buFont typeface="Arial" panose="020B0604020202020204" pitchFamily="34" charset="0"/>
-              <a:buChar char="•"/>
-            </a:pPr>
-            <a:r>
-              <a:rPr lang="nb-NO" dirty="0"/>
-              <a:t>Send </a:t>
-            </a:r>
-            <a:r>
-              <a:rPr lang="nb-NO" dirty="0" err="1"/>
-              <a:t>sms</a:t>
-            </a:r>
-            <a:r>
-              <a:rPr lang="nb-NO" dirty="0"/>
-              <a:t>/email</a:t>
-            </a:r>
-          </a:p>
-          <a:p>
-            <a:pPr marL="285750" indent="-285750" algn="ctr">
-              <a:buFont typeface="Arial" panose="020B0604020202020204" pitchFamily="34" charset="0"/>
-              <a:buChar char="•"/>
-            </a:pPr>
-            <a:r>
-              <a:rPr lang="nb-NO" dirty="0" err="1"/>
-              <a:t>Certificates</a:t>
+              <a:t>checkboxes</a:t>
             </a:r>
             <a:endParaRPr lang="nb-NO" dirty="0"/>
           </a:p>
@@ -4101,7 +3589,7 @@
     </p:spTree>
     <p:extLst>
       <p:ext uri="{BB962C8B-B14F-4D97-AF65-F5344CB8AC3E}">
-        <p14:creationId xmlns:p14="http://schemas.microsoft.com/office/powerpoint/2010/main" val="3776451133"/>
+        <p14:creationId xmlns:p14="http://schemas.microsoft.com/office/powerpoint/2010/main" val="3936905767"/>
       </p:ext>
     </p:extLst>
   </p:cSld>
@@ -4112,1564 +3600,6 @@
 </file>
 
 <file path=ppt/slides/slide3.xml><?xml version="1.0" encoding="utf-8"?>
-<p:sld xmlns:a="http://schemas.openxmlformats.org/drawingml/2006/main" xmlns:r="http://schemas.openxmlformats.org/officeDocument/2006/relationships" xmlns:p="http://schemas.openxmlformats.org/presentationml/2006/main">
-  <p:cSld>
-    <p:spTree>
-      <p:nvGrpSpPr>
-        <p:cNvPr id="1" name=""/>
-        <p:cNvGrpSpPr/>
-        <p:nvPr/>
-      </p:nvGrpSpPr>
-      <p:grpSpPr>
-        <a:xfrm>
-          <a:off x="0" y="0"/>
-          <a:ext cx="0" cy="0"/>
-          <a:chOff x="0" y="0"/>
-          <a:chExt cx="0" cy="0"/>
-        </a:xfrm>
-      </p:grpSpPr>
-      <p:sp>
-        <p:nvSpPr>
-          <p:cNvPr id="4" name="Rektangel 3">
-            <a:extLst>
-              <a:ext uri="{FF2B5EF4-FFF2-40B4-BE49-F238E27FC236}">
-                <a16:creationId xmlns:a16="http://schemas.microsoft.com/office/drawing/2014/main" id="{FD2AB0E4-F50F-AB4A-B958-C3D10E474992}"/>
-              </a:ext>
-            </a:extLst>
-          </p:cNvPr>
-          <p:cNvSpPr/>
-          <p:nvPr/>
-        </p:nvSpPr>
-        <p:spPr>
-          <a:xfrm>
-            <a:off x="979714" y="622300"/>
-            <a:ext cx="8441872" cy="6045200"/>
-          </a:xfrm>
-          <a:prstGeom prst="rect">
-            <a:avLst/>
-          </a:prstGeom>
-          <a:solidFill>
-            <a:schemeClr val="bg2"/>
-          </a:solidFill>
-        </p:spPr>
-        <p:style>
-          <a:lnRef idx="1">
-            <a:schemeClr val="accent4"/>
-          </a:lnRef>
-          <a:fillRef idx="2">
-            <a:schemeClr val="accent4"/>
-          </a:fillRef>
-          <a:effectRef idx="1">
-            <a:schemeClr val="accent4"/>
-          </a:effectRef>
-          <a:fontRef idx="minor">
-            <a:schemeClr val="dk1"/>
-          </a:fontRef>
-        </p:style>
-        <p:txBody>
-          <a:bodyPr rtlCol="0" anchor="t" anchorCtr="0"/>
-          <a:lstStyle/>
-          <a:p>
-            <a:pPr algn="ctr"/>
-            <a:r>
-              <a:rPr lang="nb-NO" dirty="0"/>
-              <a:t>MODAL Edit </a:t>
-            </a:r>
-            <a:r>
-              <a:rPr lang="nb-NO" dirty="0" err="1"/>
-              <a:t>products</a:t>
-            </a:r>
-            <a:r>
-              <a:rPr lang="nb-NO" dirty="0"/>
-              <a:t> for </a:t>
-            </a:r>
-            <a:r>
-              <a:rPr lang="nb-NO" dirty="0" err="1"/>
-              <a:t>participant</a:t>
-            </a:r>
-            <a:r>
-              <a:rPr lang="nb-NO" dirty="0"/>
-              <a:t> </a:t>
-            </a:r>
-            <a:r>
-              <a:rPr lang="nb-NO" dirty="0" err="1"/>
-              <a:t>on</a:t>
-            </a:r>
-            <a:r>
-              <a:rPr lang="nb-NO" dirty="0"/>
-              <a:t> </a:t>
-            </a:r>
-            <a:r>
-              <a:rPr lang="nb-NO" dirty="0" err="1"/>
-              <a:t>event</a:t>
-            </a:r>
-            <a:endParaRPr lang="nb-NO" dirty="0"/>
-          </a:p>
-        </p:txBody>
-      </p:sp>
-      <p:sp>
-        <p:nvSpPr>
-          <p:cNvPr id="5" name="Rektangel 4">
-            <a:extLst>
-              <a:ext uri="{FF2B5EF4-FFF2-40B4-BE49-F238E27FC236}">
-                <a16:creationId xmlns:a16="http://schemas.microsoft.com/office/drawing/2014/main" id="{A49BF7CD-4036-DA45-A43C-E967C88F053E}"/>
-              </a:ext>
-            </a:extLst>
-          </p:cNvPr>
-          <p:cNvSpPr/>
-          <p:nvPr/>
-        </p:nvSpPr>
-        <p:spPr>
-          <a:xfrm>
-            <a:off x="1170214" y="1739900"/>
-            <a:ext cx="1699986" cy="635000"/>
-          </a:xfrm>
-          <a:prstGeom prst="rect">
-            <a:avLst/>
-          </a:prstGeom>
-          <a:solidFill>
-            <a:schemeClr val="bg2"/>
-          </a:solidFill>
-        </p:spPr>
-        <p:style>
-          <a:lnRef idx="1">
-            <a:schemeClr val="accent4"/>
-          </a:lnRef>
-          <a:fillRef idx="2">
-            <a:schemeClr val="accent4"/>
-          </a:fillRef>
-          <a:effectRef idx="1">
-            <a:schemeClr val="accent4"/>
-          </a:effectRef>
-          <a:fontRef idx="minor">
-            <a:schemeClr val="dk1"/>
-          </a:fontRef>
-        </p:style>
-        <p:txBody>
-          <a:bodyPr rtlCol="0" anchor="t" anchorCtr="0"/>
-          <a:lstStyle/>
-          <a:p>
-            <a:pPr algn="ctr"/>
-            <a:r>
-              <a:rPr lang="nb-NO" dirty="0"/>
-              <a:t>Count (0 is not </a:t>
-            </a:r>
-            <a:r>
-              <a:rPr lang="nb-NO" dirty="0" err="1"/>
-              <a:t>ordered</a:t>
-            </a:r>
-            <a:r>
-              <a:rPr lang="nb-NO" dirty="0"/>
-              <a:t>)</a:t>
-            </a:r>
-          </a:p>
-        </p:txBody>
-      </p:sp>
-      <p:sp>
-        <p:nvSpPr>
-          <p:cNvPr id="6" name="Rektangel 5">
-            <a:extLst>
-              <a:ext uri="{FF2B5EF4-FFF2-40B4-BE49-F238E27FC236}">
-                <a16:creationId xmlns:a16="http://schemas.microsoft.com/office/drawing/2014/main" id="{26411AD9-890B-E440-8E18-87880E7A269A}"/>
-              </a:ext>
-            </a:extLst>
-          </p:cNvPr>
-          <p:cNvSpPr/>
-          <p:nvPr/>
-        </p:nvSpPr>
-        <p:spPr>
-          <a:xfrm>
-            <a:off x="3060700" y="1752600"/>
-            <a:ext cx="1877786" cy="635000"/>
-          </a:xfrm>
-          <a:prstGeom prst="rect">
-            <a:avLst/>
-          </a:prstGeom>
-          <a:solidFill>
-            <a:schemeClr val="bg2"/>
-          </a:solidFill>
-          <a:ln>
-            <a:noFill/>
-          </a:ln>
-        </p:spPr>
-        <p:style>
-          <a:lnRef idx="1">
-            <a:schemeClr val="accent4"/>
-          </a:lnRef>
-          <a:fillRef idx="2">
-            <a:schemeClr val="accent4"/>
-          </a:fillRef>
-          <a:effectRef idx="1">
-            <a:schemeClr val="accent4"/>
-          </a:effectRef>
-          <a:fontRef idx="minor">
-            <a:schemeClr val="dk1"/>
-          </a:fontRef>
-        </p:style>
-        <p:txBody>
-          <a:bodyPr rtlCol="0" anchor="t" anchorCtr="0"/>
-          <a:lstStyle/>
-          <a:p>
-            <a:r>
-              <a:rPr lang="nb-NO" b="1" dirty="0"/>
-              <a:t>Product </a:t>
-            </a:r>
-            <a:r>
-              <a:rPr lang="nb-NO" b="1" dirty="0" err="1"/>
-              <a:t>title</a:t>
-            </a:r>
-            <a:endParaRPr lang="nb-NO" b="1" dirty="0"/>
-          </a:p>
-          <a:p>
-            <a:r>
-              <a:rPr lang="nb-NO" dirty="0" err="1"/>
-              <a:t>Description</a:t>
-            </a:r>
-            <a:endParaRPr lang="nb-NO" dirty="0"/>
-          </a:p>
-        </p:txBody>
-      </p:sp>
-      <p:sp>
-        <p:nvSpPr>
-          <p:cNvPr id="7" name="Rektangel 6">
-            <a:extLst>
-              <a:ext uri="{FF2B5EF4-FFF2-40B4-BE49-F238E27FC236}">
-                <a16:creationId xmlns:a16="http://schemas.microsoft.com/office/drawing/2014/main" id="{2FAC9F50-4F8B-5E4A-9673-17C4D36B3DD8}"/>
-              </a:ext>
-            </a:extLst>
-          </p:cNvPr>
-          <p:cNvSpPr/>
-          <p:nvPr/>
-        </p:nvSpPr>
-        <p:spPr>
-          <a:xfrm>
-            <a:off x="3403600" y="2603500"/>
-            <a:ext cx="1877786" cy="635000"/>
-          </a:xfrm>
-          <a:prstGeom prst="rect">
-            <a:avLst/>
-          </a:prstGeom>
-          <a:solidFill>
-            <a:schemeClr val="bg2"/>
-          </a:solidFill>
-          <a:ln>
-            <a:noFill/>
-          </a:ln>
-        </p:spPr>
-        <p:style>
-          <a:lnRef idx="1">
-            <a:schemeClr val="accent4"/>
-          </a:lnRef>
-          <a:fillRef idx="2">
-            <a:schemeClr val="accent4"/>
-          </a:fillRef>
-          <a:effectRef idx="1">
-            <a:schemeClr val="accent4"/>
-          </a:effectRef>
-          <a:fontRef idx="minor">
-            <a:schemeClr val="dk1"/>
-          </a:fontRef>
-        </p:style>
-        <p:txBody>
-          <a:bodyPr rtlCol="0" anchor="t" anchorCtr="0"/>
-          <a:lstStyle/>
-          <a:p>
-            <a:pPr algn="ctr"/>
-            <a:r>
-              <a:rPr lang="nb-NO" b="1" dirty="0"/>
-              <a:t>Product variant 1</a:t>
-            </a:r>
-          </a:p>
-        </p:txBody>
-      </p:sp>
-      <p:sp>
-        <p:nvSpPr>
-          <p:cNvPr id="9" name="Ramme 8">
-            <a:extLst>
-              <a:ext uri="{FF2B5EF4-FFF2-40B4-BE49-F238E27FC236}">
-                <a16:creationId xmlns:a16="http://schemas.microsoft.com/office/drawing/2014/main" id="{1A639959-2A0E-5D48-B5C4-AA4F43AB9DFA}"/>
-              </a:ext>
-            </a:extLst>
-          </p:cNvPr>
-          <p:cNvSpPr/>
-          <p:nvPr/>
-        </p:nvSpPr>
-        <p:spPr>
-          <a:xfrm>
-            <a:off x="3060700" y="2603500"/>
-            <a:ext cx="342900" cy="317500"/>
-          </a:xfrm>
-          <a:prstGeom prst="frame">
-            <a:avLst/>
-          </a:prstGeom>
-        </p:spPr>
-        <p:style>
-          <a:lnRef idx="2">
-            <a:schemeClr val="accent1">
-              <a:shade val="50000"/>
-            </a:schemeClr>
-          </a:lnRef>
-          <a:fillRef idx="1">
-            <a:schemeClr val="accent1"/>
-          </a:fillRef>
-          <a:effectRef idx="0">
-            <a:schemeClr val="accent1"/>
-          </a:effectRef>
-          <a:fontRef idx="minor">
-            <a:schemeClr val="lt1"/>
-          </a:fontRef>
-        </p:style>
-        <p:txBody>
-          <a:bodyPr rtlCol="0" anchor="ctr"/>
-          <a:lstStyle/>
-          <a:p>
-            <a:pPr algn="ctr"/>
-            <a:endParaRPr lang="nb-NO">
-              <a:solidFill>
-                <a:schemeClr val="tx1"/>
-              </a:solidFill>
-            </a:endParaRPr>
-          </a:p>
-        </p:txBody>
-      </p:sp>
-      <p:sp>
-        <p:nvSpPr>
-          <p:cNvPr id="10" name="Rektangel 9">
-            <a:extLst>
-              <a:ext uri="{FF2B5EF4-FFF2-40B4-BE49-F238E27FC236}">
-                <a16:creationId xmlns:a16="http://schemas.microsoft.com/office/drawing/2014/main" id="{5F375B5A-54BD-4C4D-AE01-6119BB22036C}"/>
-              </a:ext>
-            </a:extLst>
-          </p:cNvPr>
-          <p:cNvSpPr/>
-          <p:nvPr/>
-        </p:nvSpPr>
-        <p:spPr>
-          <a:xfrm>
-            <a:off x="5816600" y="2603500"/>
-            <a:ext cx="1877786" cy="635000"/>
-          </a:xfrm>
-          <a:prstGeom prst="rect">
-            <a:avLst/>
-          </a:prstGeom>
-          <a:solidFill>
-            <a:schemeClr val="bg2"/>
-          </a:solidFill>
-          <a:ln>
-            <a:noFill/>
-          </a:ln>
-        </p:spPr>
-        <p:style>
-          <a:lnRef idx="1">
-            <a:schemeClr val="accent4"/>
-          </a:lnRef>
-          <a:fillRef idx="2">
-            <a:schemeClr val="accent4"/>
-          </a:fillRef>
-          <a:effectRef idx="1">
-            <a:schemeClr val="accent4"/>
-          </a:effectRef>
-          <a:fontRef idx="minor">
-            <a:schemeClr val="dk1"/>
-          </a:fontRef>
-        </p:style>
-        <p:txBody>
-          <a:bodyPr rtlCol="0" anchor="t" anchorCtr="0"/>
-          <a:lstStyle/>
-          <a:p>
-            <a:pPr algn="ctr"/>
-            <a:r>
-              <a:rPr lang="nb-NO" b="1" dirty="0"/>
-              <a:t>Product variant 2</a:t>
-            </a:r>
-          </a:p>
-        </p:txBody>
-      </p:sp>
-      <p:sp>
-        <p:nvSpPr>
-          <p:cNvPr id="11" name="Ramme 10">
-            <a:extLst>
-              <a:ext uri="{FF2B5EF4-FFF2-40B4-BE49-F238E27FC236}">
-                <a16:creationId xmlns:a16="http://schemas.microsoft.com/office/drawing/2014/main" id="{3AB60D70-FD19-5342-A201-467ECCBF0934}"/>
-              </a:ext>
-            </a:extLst>
-          </p:cNvPr>
-          <p:cNvSpPr/>
-          <p:nvPr/>
-        </p:nvSpPr>
-        <p:spPr>
-          <a:xfrm>
-            <a:off x="5473700" y="2603500"/>
-            <a:ext cx="342900" cy="317500"/>
-          </a:xfrm>
-          <a:prstGeom prst="frame">
-            <a:avLst/>
-          </a:prstGeom>
-        </p:spPr>
-        <p:style>
-          <a:lnRef idx="2">
-            <a:schemeClr val="accent1">
-              <a:shade val="50000"/>
-            </a:schemeClr>
-          </a:lnRef>
-          <a:fillRef idx="1">
-            <a:schemeClr val="accent1"/>
-          </a:fillRef>
-          <a:effectRef idx="0">
-            <a:schemeClr val="accent1"/>
-          </a:effectRef>
-          <a:fontRef idx="minor">
-            <a:schemeClr val="lt1"/>
-          </a:fontRef>
-        </p:style>
-        <p:txBody>
-          <a:bodyPr rtlCol="0" anchor="ctr"/>
-          <a:lstStyle/>
-          <a:p>
-            <a:pPr algn="ctr"/>
-            <a:endParaRPr lang="nb-NO">
-              <a:solidFill>
-                <a:schemeClr val="tx1"/>
-              </a:solidFill>
-            </a:endParaRPr>
-          </a:p>
-        </p:txBody>
-      </p:sp>
-      <p:sp>
-        <p:nvSpPr>
-          <p:cNvPr id="12" name="Rektangel 11">
-            <a:extLst>
-              <a:ext uri="{FF2B5EF4-FFF2-40B4-BE49-F238E27FC236}">
-                <a16:creationId xmlns:a16="http://schemas.microsoft.com/office/drawing/2014/main" id="{320B0D7C-2648-0A4C-9E1D-60B45C1025FA}"/>
-              </a:ext>
-            </a:extLst>
-          </p:cNvPr>
-          <p:cNvSpPr/>
-          <p:nvPr/>
-        </p:nvSpPr>
-        <p:spPr>
-          <a:xfrm>
-            <a:off x="1170214" y="3479800"/>
-            <a:ext cx="1699986" cy="635000"/>
-          </a:xfrm>
-          <a:prstGeom prst="rect">
-            <a:avLst/>
-          </a:prstGeom>
-          <a:solidFill>
-            <a:schemeClr val="bg2"/>
-          </a:solidFill>
-        </p:spPr>
-        <p:style>
-          <a:lnRef idx="1">
-            <a:schemeClr val="accent4"/>
-          </a:lnRef>
-          <a:fillRef idx="2">
-            <a:schemeClr val="accent4"/>
-          </a:fillRef>
-          <a:effectRef idx="1">
-            <a:schemeClr val="accent4"/>
-          </a:effectRef>
-          <a:fontRef idx="minor">
-            <a:schemeClr val="dk1"/>
-          </a:fontRef>
-        </p:style>
-        <p:txBody>
-          <a:bodyPr rtlCol="0" anchor="t" anchorCtr="0"/>
-          <a:lstStyle/>
-          <a:p>
-            <a:pPr algn="ctr"/>
-            <a:r>
-              <a:rPr lang="nb-NO" dirty="0"/>
-              <a:t>Count (0 is not </a:t>
-            </a:r>
-            <a:r>
-              <a:rPr lang="nb-NO" dirty="0" err="1"/>
-              <a:t>ordered</a:t>
-            </a:r>
-            <a:r>
-              <a:rPr lang="nb-NO" dirty="0"/>
-              <a:t>)</a:t>
-            </a:r>
-          </a:p>
-        </p:txBody>
-      </p:sp>
-      <p:sp>
-        <p:nvSpPr>
-          <p:cNvPr id="13" name="Rektangel 12">
-            <a:extLst>
-              <a:ext uri="{FF2B5EF4-FFF2-40B4-BE49-F238E27FC236}">
-                <a16:creationId xmlns:a16="http://schemas.microsoft.com/office/drawing/2014/main" id="{76E38E54-BFE6-754C-9654-6DD9166E1A21}"/>
-              </a:ext>
-            </a:extLst>
-          </p:cNvPr>
-          <p:cNvSpPr/>
-          <p:nvPr/>
-        </p:nvSpPr>
-        <p:spPr>
-          <a:xfrm>
-            <a:off x="3060700" y="3492500"/>
-            <a:ext cx="1877786" cy="635000"/>
-          </a:xfrm>
-          <a:prstGeom prst="rect">
-            <a:avLst/>
-          </a:prstGeom>
-          <a:solidFill>
-            <a:schemeClr val="bg2"/>
-          </a:solidFill>
-          <a:ln>
-            <a:noFill/>
-          </a:ln>
-        </p:spPr>
-        <p:style>
-          <a:lnRef idx="1">
-            <a:schemeClr val="accent4"/>
-          </a:lnRef>
-          <a:fillRef idx="2">
-            <a:schemeClr val="accent4"/>
-          </a:fillRef>
-          <a:effectRef idx="1">
-            <a:schemeClr val="accent4"/>
-          </a:effectRef>
-          <a:fontRef idx="minor">
-            <a:schemeClr val="dk1"/>
-          </a:fontRef>
-        </p:style>
-        <p:txBody>
-          <a:bodyPr rtlCol="0" anchor="t" anchorCtr="0"/>
-          <a:lstStyle/>
-          <a:p>
-            <a:r>
-              <a:rPr lang="nb-NO" b="1" dirty="0"/>
-              <a:t>Product </a:t>
-            </a:r>
-            <a:r>
-              <a:rPr lang="nb-NO" b="1" dirty="0" err="1"/>
-              <a:t>title</a:t>
-            </a:r>
-            <a:endParaRPr lang="nb-NO" b="1" dirty="0"/>
-          </a:p>
-          <a:p>
-            <a:r>
-              <a:rPr lang="nb-NO" dirty="0" err="1"/>
-              <a:t>Description</a:t>
-            </a:r>
-            <a:endParaRPr lang="nb-NO" dirty="0"/>
-          </a:p>
-        </p:txBody>
-      </p:sp>
-      <p:sp>
-        <p:nvSpPr>
-          <p:cNvPr id="14" name="Rektangel 13">
-            <a:extLst>
-              <a:ext uri="{FF2B5EF4-FFF2-40B4-BE49-F238E27FC236}">
-                <a16:creationId xmlns:a16="http://schemas.microsoft.com/office/drawing/2014/main" id="{CC8FAB10-32A6-CE44-8286-B7DC829430B1}"/>
-              </a:ext>
-            </a:extLst>
-          </p:cNvPr>
-          <p:cNvSpPr/>
-          <p:nvPr/>
-        </p:nvSpPr>
-        <p:spPr>
-          <a:xfrm>
-            <a:off x="1170214" y="4686300"/>
-            <a:ext cx="1699986" cy="635000"/>
-          </a:xfrm>
-          <a:prstGeom prst="rect">
-            <a:avLst/>
-          </a:prstGeom>
-          <a:solidFill>
-            <a:schemeClr val="bg2"/>
-          </a:solidFill>
-        </p:spPr>
-        <p:style>
-          <a:lnRef idx="1">
-            <a:schemeClr val="accent4"/>
-          </a:lnRef>
-          <a:fillRef idx="2">
-            <a:schemeClr val="accent4"/>
-          </a:fillRef>
-          <a:effectRef idx="1">
-            <a:schemeClr val="accent4"/>
-          </a:effectRef>
-          <a:fontRef idx="minor">
-            <a:schemeClr val="dk1"/>
-          </a:fontRef>
-        </p:style>
-        <p:txBody>
-          <a:bodyPr rtlCol="0" anchor="t" anchorCtr="0"/>
-          <a:lstStyle/>
-          <a:p>
-            <a:pPr algn="ctr"/>
-            <a:r>
-              <a:rPr lang="nb-NO" dirty="0"/>
-              <a:t>Count (0 is not </a:t>
-            </a:r>
-            <a:r>
-              <a:rPr lang="nb-NO" dirty="0" err="1"/>
-              <a:t>ordered</a:t>
-            </a:r>
-            <a:r>
-              <a:rPr lang="nb-NO" dirty="0"/>
-              <a:t>)</a:t>
-            </a:r>
-          </a:p>
-        </p:txBody>
-      </p:sp>
-      <p:sp>
-        <p:nvSpPr>
-          <p:cNvPr id="15" name="Rektangel 14">
-            <a:extLst>
-              <a:ext uri="{FF2B5EF4-FFF2-40B4-BE49-F238E27FC236}">
-                <a16:creationId xmlns:a16="http://schemas.microsoft.com/office/drawing/2014/main" id="{7799ED9E-7B1D-B140-B9F4-F358BB6E7260}"/>
-              </a:ext>
-            </a:extLst>
-          </p:cNvPr>
-          <p:cNvSpPr/>
-          <p:nvPr/>
-        </p:nvSpPr>
-        <p:spPr>
-          <a:xfrm>
-            <a:off x="3060700" y="4622800"/>
-            <a:ext cx="1877786" cy="635000"/>
-          </a:xfrm>
-          <a:prstGeom prst="rect">
-            <a:avLst/>
-          </a:prstGeom>
-          <a:solidFill>
-            <a:schemeClr val="bg2"/>
-          </a:solidFill>
-          <a:ln>
-            <a:noFill/>
-          </a:ln>
-        </p:spPr>
-        <p:style>
-          <a:lnRef idx="1">
-            <a:schemeClr val="accent4"/>
-          </a:lnRef>
-          <a:fillRef idx="2">
-            <a:schemeClr val="accent4"/>
-          </a:fillRef>
-          <a:effectRef idx="1">
-            <a:schemeClr val="accent4"/>
-          </a:effectRef>
-          <a:fontRef idx="minor">
-            <a:schemeClr val="dk1"/>
-          </a:fontRef>
-        </p:style>
-        <p:txBody>
-          <a:bodyPr rtlCol="0" anchor="t" anchorCtr="0"/>
-          <a:lstStyle/>
-          <a:p>
-            <a:r>
-              <a:rPr lang="nb-NO" b="1" dirty="0"/>
-              <a:t>Product </a:t>
-            </a:r>
-            <a:r>
-              <a:rPr lang="nb-NO" b="1" dirty="0" err="1"/>
-              <a:t>title</a:t>
-            </a:r>
-            <a:endParaRPr lang="nb-NO" b="1" dirty="0"/>
-          </a:p>
-          <a:p>
-            <a:r>
-              <a:rPr lang="nb-NO" dirty="0" err="1"/>
-              <a:t>Description</a:t>
-            </a:r>
-            <a:endParaRPr lang="nb-NO" dirty="0"/>
-          </a:p>
-        </p:txBody>
-      </p:sp>
-      <p:sp>
-        <p:nvSpPr>
-          <p:cNvPr id="16" name="Rektangel 15">
-            <a:extLst>
-              <a:ext uri="{FF2B5EF4-FFF2-40B4-BE49-F238E27FC236}">
-                <a16:creationId xmlns:a16="http://schemas.microsoft.com/office/drawing/2014/main" id="{EE6F0714-61AF-AE49-B6FA-9EE1AEB62059}"/>
-              </a:ext>
-            </a:extLst>
-          </p:cNvPr>
-          <p:cNvSpPr/>
-          <p:nvPr/>
-        </p:nvSpPr>
-        <p:spPr>
-          <a:xfrm>
-            <a:off x="2113643" y="5892800"/>
-            <a:ext cx="2095500" cy="547497"/>
-          </a:xfrm>
-          <a:prstGeom prst="rect">
-            <a:avLst/>
-          </a:prstGeom>
-          <a:solidFill>
-            <a:schemeClr val="accent5"/>
-          </a:solidFill>
-        </p:spPr>
-        <p:style>
-          <a:lnRef idx="1">
-            <a:schemeClr val="accent4"/>
-          </a:lnRef>
-          <a:fillRef idx="2">
-            <a:schemeClr val="accent4"/>
-          </a:fillRef>
-          <a:effectRef idx="1">
-            <a:schemeClr val="accent4"/>
-          </a:effectRef>
-          <a:fontRef idx="minor">
-            <a:schemeClr val="dk1"/>
-          </a:fontRef>
-        </p:style>
-        <p:txBody>
-          <a:bodyPr rtlCol="0" anchor="t" anchorCtr="0"/>
-          <a:lstStyle/>
-          <a:p>
-            <a:pPr algn="ctr"/>
-            <a:r>
-              <a:rPr lang="nb-NO" sz="1400" dirty="0"/>
-              <a:t>Update </a:t>
-            </a:r>
-            <a:r>
-              <a:rPr lang="nb-NO" sz="1400" dirty="0" err="1"/>
-              <a:t>products</a:t>
-            </a:r>
-            <a:r>
-              <a:rPr lang="nb-NO" sz="1400" dirty="0"/>
-              <a:t> for </a:t>
-            </a:r>
-            <a:r>
-              <a:rPr lang="nb-NO" sz="1400" dirty="0" err="1"/>
-              <a:t>particiapant</a:t>
-            </a:r>
-            <a:endParaRPr lang="nb-NO" sz="1400" dirty="0"/>
-          </a:p>
-        </p:txBody>
-      </p:sp>
-      <p:sp>
-        <p:nvSpPr>
-          <p:cNvPr id="17" name="Rektangel 16">
-            <a:extLst>
-              <a:ext uri="{FF2B5EF4-FFF2-40B4-BE49-F238E27FC236}">
-                <a16:creationId xmlns:a16="http://schemas.microsoft.com/office/drawing/2014/main" id="{AAD57512-A578-9644-A37A-7B6C10E673B2}"/>
-              </a:ext>
-            </a:extLst>
-          </p:cNvPr>
-          <p:cNvSpPr/>
-          <p:nvPr/>
-        </p:nvSpPr>
-        <p:spPr>
-          <a:xfrm>
-            <a:off x="4564743" y="5892800"/>
-            <a:ext cx="2095500" cy="547497"/>
-          </a:xfrm>
-          <a:prstGeom prst="rect">
-            <a:avLst/>
-          </a:prstGeom>
-          <a:solidFill>
-            <a:schemeClr val="accent5"/>
-          </a:solidFill>
-        </p:spPr>
-        <p:style>
-          <a:lnRef idx="1">
-            <a:schemeClr val="accent4"/>
-          </a:lnRef>
-          <a:fillRef idx="2">
-            <a:schemeClr val="accent4"/>
-          </a:fillRef>
-          <a:effectRef idx="1">
-            <a:schemeClr val="accent4"/>
-          </a:effectRef>
-          <a:fontRef idx="minor">
-            <a:schemeClr val="dk1"/>
-          </a:fontRef>
-        </p:style>
-        <p:txBody>
-          <a:bodyPr rtlCol="0" anchor="t" anchorCtr="0"/>
-          <a:lstStyle/>
-          <a:p>
-            <a:pPr algn="ctr"/>
-            <a:r>
-              <a:rPr lang="nb-NO" sz="1400" dirty="0" err="1"/>
-              <a:t>Cancel</a:t>
-            </a:r>
-            <a:endParaRPr lang="nb-NO" sz="1400" dirty="0"/>
-          </a:p>
-        </p:txBody>
-      </p:sp>
-    </p:spTree>
-    <p:extLst>
-      <p:ext uri="{BB962C8B-B14F-4D97-AF65-F5344CB8AC3E}">
-        <p14:creationId xmlns:p14="http://schemas.microsoft.com/office/powerpoint/2010/main" val="1619357878"/>
-      </p:ext>
-    </p:extLst>
-  </p:cSld>
-  <p:clrMapOvr>
-    <a:masterClrMapping/>
-  </p:clrMapOvr>
-</p:sld>
-</file>
-
-<file path=ppt/slides/slide4.xml><?xml version="1.0" encoding="utf-8"?>
-<p:sld xmlns:a="http://schemas.openxmlformats.org/drawingml/2006/main" xmlns:r="http://schemas.openxmlformats.org/officeDocument/2006/relationships" xmlns:p="http://schemas.openxmlformats.org/presentationml/2006/main">
-  <p:cSld>
-    <p:spTree>
-      <p:nvGrpSpPr>
-        <p:cNvPr id="1" name=""/>
-        <p:cNvGrpSpPr/>
-        <p:nvPr/>
-      </p:nvGrpSpPr>
-      <p:grpSpPr>
-        <a:xfrm>
-          <a:off x="0" y="0"/>
-          <a:ext cx="0" cy="0"/>
-          <a:chOff x="0" y="0"/>
-          <a:chExt cx="0" cy="0"/>
-        </a:xfrm>
-      </p:grpSpPr>
-      <p:sp>
-        <p:nvSpPr>
-          <p:cNvPr id="2" name="Tittel 1">
-            <a:extLst>
-              <a:ext uri="{FF2B5EF4-FFF2-40B4-BE49-F238E27FC236}">
-                <a16:creationId xmlns:a16="http://schemas.microsoft.com/office/drawing/2014/main" id="{30EE85DC-EB70-E940-9ACA-0D1F01EC6997}"/>
-              </a:ext>
-            </a:extLst>
-          </p:cNvPr>
-          <p:cNvSpPr>
-            <a:spLocks noGrp="1"/>
-          </p:cNvSpPr>
-          <p:nvPr>
-            <p:ph type="title"/>
-          </p:nvPr>
-        </p:nvSpPr>
-        <p:spPr>
-          <a:xfrm>
-            <a:off x="355599" y="297960"/>
-            <a:ext cx="11442701" cy="718040"/>
-          </a:xfrm>
-        </p:spPr>
-        <p:txBody>
-          <a:bodyPr>
-            <a:normAutofit fontScale="90000"/>
-          </a:bodyPr>
-          <a:lstStyle/>
-          <a:p>
-            <a:r>
-              <a:rPr lang="nb-NO" dirty="0" err="1"/>
-              <a:t>When</a:t>
-            </a:r>
-            <a:r>
-              <a:rPr lang="nb-NO" dirty="0"/>
-              <a:t> </a:t>
-            </a:r>
-            <a:r>
-              <a:rPr lang="nb-NO" dirty="0" err="1"/>
-              <a:t>ordered</a:t>
-            </a:r>
-            <a:r>
-              <a:rPr lang="nb-NO" dirty="0"/>
-              <a:t> </a:t>
-            </a:r>
-            <a:r>
-              <a:rPr lang="nb-NO" dirty="0" err="1"/>
-              <a:t>products</a:t>
-            </a:r>
-            <a:r>
-              <a:rPr lang="nb-NO" dirty="0"/>
-              <a:t> </a:t>
-            </a:r>
-            <a:r>
-              <a:rPr lang="nb-NO" dirty="0" err="1"/>
-              <a:t>are</a:t>
-            </a:r>
-            <a:r>
-              <a:rPr lang="nb-NO" dirty="0"/>
-              <a:t> </a:t>
-            </a:r>
-            <a:r>
-              <a:rPr lang="nb-NO" dirty="0" err="1"/>
-              <a:t>updated</a:t>
-            </a:r>
-            <a:endParaRPr lang="nb-NO" dirty="0"/>
-          </a:p>
-        </p:txBody>
-      </p:sp>
-      <p:sp>
-        <p:nvSpPr>
-          <p:cNvPr id="4" name="Rektangel 3">
-            <a:extLst>
-              <a:ext uri="{FF2B5EF4-FFF2-40B4-BE49-F238E27FC236}">
-                <a16:creationId xmlns:a16="http://schemas.microsoft.com/office/drawing/2014/main" id="{A3F8BE74-B3A8-CB40-8CA6-3AC780D872E1}"/>
-              </a:ext>
-            </a:extLst>
-          </p:cNvPr>
-          <p:cNvSpPr/>
-          <p:nvPr/>
-        </p:nvSpPr>
-        <p:spPr>
-          <a:xfrm>
-            <a:off x="475343" y="1473200"/>
-            <a:ext cx="2095500" cy="547497"/>
-          </a:xfrm>
-          <a:prstGeom prst="rect">
-            <a:avLst/>
-          </a:prstGeom>
-          <a:solidFill>
-            <a:schemeClr val="accent5"/>
-          </a:solidFill>
-        </p:spPr>
-        <p:style>
-          <a:lnRef idx="1">
-            <a:schemeClr val="accent4"/>
-          </a:lnRef>
-          <a:fillRef idx="2">
-            <a:schemeClr val="accent4"/>
-          </a:fillRef>
-          <a:effectRef idx="1">
-            <a:schemeClr val="accent4"/>
-          </a:effectRef>
-          <a:fontRef idx="minor">
-            <a:schemeClr val="dk1"/>
-          </a:fontRef>
-        </p:style>
-        <p:txBody>
-          <a:bodyPr rtlCol="0" anchor="t" anchorCtr="0"/>
-          <a:lstStyle/>
-          <a:p>
-            <a:pPr algn="ctr"/>
-            <a:r>
-              <a:rPr lang="nb-NO" sz="1400" dirty="0" err="1"/>
-              <a:t>Particapant</a:t>
-            </a:r>
-            <a:r>
-              <a:rPr lang="nb-NO" sz="1400" dirty="0"/>
-              <a:t> has a draft or </a:t>
-            </a:r>
-            <a:r>
-              <a:rPr lang="nb-NO" sz="1400" dirty="0" err="1"/>
-              <a:t>verified</a:t>
-            </a:r>
-            <a:r>
-              <a:rPr lang="nb-NO" sz="1400" dirty="0"/>
-              <a:t> order</a:t>
-            </a:r>
-          </a:p>
-        </p:txBody>
-      </p:sp>
-      <p:sp>
-        <p:nvSpPr>
-          <p:cNvPr id="5" name="Rektangel 4">
-            <a:extLst>
-              <a:ext uri="{FF2B5EF4-FFF2-40B4-BE49-F238E27FC236}">
-                <a16:creationId xmlns:a16="http://schemas.microsoft.com/office/drawing/2014/main" id="{DA6AC846-0644-644E-91F9-47662FA217E3}"/>
-              </a:ext>
-            </a:extLst>
-          </p:cNvPr>
-          <p:cNvSpPr/>
-          <p:nvPr/>
-        </p:nvSpPr>
-        <p:spPr>
-          <a:xfrm>
-            <a:off x="4564743" y="1473200"/>
-            <a:ext cx="2095500" cy="547497"/>
-          </a:xfrm>
-          <a:prstGeom prst="rect">
-            <a:avLst/>
-          </a:prstGeom>
-          <a:solidFill>
-            <a:schemeClr val="accent5"/>
-          </a:solidFill>
-        </p:spPr>
-        <p:style>
-          <a:lnRef idx="1">
-            <a:schemeClr val="accent4"/>
-          </a:lnRef>
-          <a:fillRef idx="2">
-            <a:schemeClr val="accent4"/>
-          </a:fillRef>
-          <a:effectRef idx="1">
-            <a:schemeClr val="accent4"/>
-          </a:effectRef>
-          <a:fontRef idx="minor">
-            <a:schemeClr val="dk1"/>
-          </a:fontRef>
-        </p:style>
-        <p:txBody>
-          <a:bodyPr rtlCol="0" anchor="t" anchorCtr="0"/>
-          <a:lstStyle/>
-          <a:p>
-            <a:pPr algn="ctr"/>
-            <a:r>
-              <a:rPr lang="nb-NO" sz="1400" dirty="0"/>
-              <a:t>Update order</a:t>
-            </a:r>
-          </a:p>
-        </p:txBody>
-      </p:sp>
-      <p:sp>
-        <p:nvSpPr>
-          <p:cNvPr id="7" name="Rektangel 6">
-            <a:extLst>
-              <a:ext uri="{FF2B5EF4-FFF2-40B4-BE49-F238E27FC236}">
-                <a16:creationId xmlns:a16="http://schemas.microsoft.com/office/drawing/2014/main" id="{57101990-06C4-E146-A450-F0209EB61CA3}"/>
-              </a:ext>
-            </a:extLst>
-          </p:cNvPr>
-          <p:cNvSpPr/>
-          <p:nvPr/>
-        </p:nvSpPr>
-        <p:spPr>
-          <a:xfrm>
-            <a:off x="475343" y="2425700"/>
-            <a:ext cx="2095500" cy="2243463"/>
-          </a:xfrm>
-          <a:prstGeom prst="rect">
-            <a:avLst/>
-          </a:prstGeom>
-          <a:solidFill>
-            <a:schemeClr val="accent5"/>
-          </a:solidFill>
-        </p:spPr>
-        <p:style>
-          <a:lnRef idx="1">
-            <a:schemeClr val="accent4"/>
-          </a:lnRef>
-          <a:fillRef idx="2">
-            <a:schemeClr val="accent4"/>
-          </a:fillRef>
-          <a:effectRef idx="1">
-            <a:schemeClr val="accent4"/>
-          </a:effectRef>
-          <a:fontRef idx="minor">
-            <a:schemeClr val="dk1"/>
-          </a:fontRef>
-        </p:style>
-        <p:txBody>
-          <a:bodyPr rtlCol="0" anchor="t" anchorCtr="0"/>
-          <a:lstStyle/>
-          <a:p>
-            <a:pPr algn="ctr"/>
-            <a:r>
-              <a:rPr lang="nb-NO" sz="1400" dirty="0" err="1"/>
-              <a:t>Particapant</a:t>
-            </a:r>
-            <a:r>
-              <a:rPr lang="nb-NO" sz="1400" dirty="0"/>
-              <a:t> has a </a:t>
-            </a:r>
-            <a:r>
-              <a:rPr lang="nb-NO" sz="1400" dirty="0" err="1"/>
-              <a:t>invoiced</a:t>
-            </a:r>
-            <a:r>
-              <a:rPr lang="nb-NO" sz="1400" dirty="0"/>
-              <a:t> order</a:t>
-            </a:r>
-          </a:p>
-        </p:txBody>
-      </p:sp>
-      <p:cxnSp>
-        <p:nvCxnSpPr>
-          <p:cNvPr id="11" name="Rett pil 10">
-            <a:extLst>
-              <a:ext uri="{FF2B5EF4-FFF2-40B4-BE49-F238E27FC236}">
-                <a16:creationId xmlns:a16="http://schemas.microsoft.com/office/drawing/2014/main" id="{E0C4FD3B-5634-1D44-B075-B9C88FDD5238}"/>
-              </a:ext>
-            </a:extLst>
-          </p:cNvPr>
-          <p:cNvCxnSpPr/>
-          <p:nvPr/>
-        </p:nvCxnSpPr>
-        <p:spPr>
-          <a:xfrm>
-            <a:off x="2908300" y="1689100"/>
-            <a:ext cx="1346200" cy="0"/>
-          </a:xfrm>
-          <a:prstGeom prst="straightConnector1">
-            <a:avLst/>
-          </a:prstGeom>
-          <a:ln>
-            <a:tailEnd type="triangle"/>
-          </a:ln>
-        </p:spPr>
-        <p:style>
-          <a:lnRef idx="1">
-            <a:schemeClr val="accent1"/>
-          </a:lnRef>
-          <a:fillRef idx="0">
-            <a:schemeClr val="accent1"/>
-          </a:fillRef>
-          <a:effectRef idx="0">
-            <a:schemeClr val="accent1"/>
-          </a:effectRef>
-          <a:fontRef idx="minor">
-            <a:schemeClr val="tx1"/>
-          </a:fontRef>
-        </p:style>
-      </p:cxnSp>
-      <p:cxnSp>
-        <p:nvCxnSpPr>
-          <p:cNvPr id="12" name="Rett pil 11">
-            <a:extLst>
-              <a:ext uri="{FF2B5EF4-FFF2-40B4-BE49-F238E27FC236}">
-                <a16:creationId xmlns:a16="http://schemas.microsoft.com/office/drawing/2014/main" id="{2AC50735-A222-AB4E-A2E9-25606796BC92}"/>
-              </a:ext>
-            </a:extLst>
-          </p:cNvPr>
-          <p:cNvCxnSpPr>
-            <a:cxnSpLocks/>
-          </p:cNvCxnSpPr>
-          <p:nvPr/>
-        </p:nvCxnSpPr>
-        <p:spPr>
-          <a:xfrm>
-            <a:off x="2908300" y="2832100"/>
-            <a:ext cx="2438400" cy="0"/>
-          </a:xfrm>
-          <a:prstGeom prst="straightConnector1">
-            <a:avLst/>
-          </a:prstGeom>
-          <a:ln>
-            <a:tailEnd type="triangle"/>
-          </a:ln>
-        </p:spPr>
-        <p:style>
-          <a:lnRef idx="1">
-            <a:schemeClr val="accent1"/>
-          </a:lnRef>
-          <a:fillRef idx="0">
-            <a:schemeClr val="accent1"/>
-          </a:fillRef>
-          <a:effectRef idx="0">
-            <a:schemeClr val="accent1"/>
-          </a:effectRef>
-          <a:fontRef idx="minor">
-            <a:schemeClr val="tx1"/>
-          </a:fontRef>
-        </p:style>
-      </p:cxnSp>
-      <p:sp>
-        <p:nvSpPr>
-          <p:cNvPr id="13" name="TekstSylinder 12">
-            <a:extLst>
-              <a:ext uri="{FF2B5EF4-FFF2-40B4-BE49-F238E27FC236}">
-                <a16:creationId xmlns:a16="http://schemas.microsoft.com/office/drawing/2014/main" id="{028464B8-1308-4B45-9BDB-AEE2C04F574C}"/>
-              </a:ext>
-            </a:extLst>
-          </p:cNvPr>
-          <p:cNvSpPr txBox="1"/>
-          <p:nvPr/>
-        </p:nvSpPr>
-        <p:spPr>
-          <a:xfrm>
-            <a:off x="3312566" y="2467265"/>
-            <a:ext cx="1768433" cy="307777"/>
-          </a:xfrm>
-          <a:prstGeom prst="rect">
-            <a:avLst/>
-          </a:prstGeom>
-          <a:noFill/>
-        </p:spPr>
-        <p:txBody>
-          <a:bodyPr wrap="none" rtlCol="0">
-            <a:spAutoFit/>
-          </a:bodyPr>
-          <a:lstStyle/>
-          <a:p>
-            <a:r>
-              <a:rPr lang="nb-NO" sz="1400" dirty="0" err="1"/>
-              <a:t>Only</a:t>
-            </a:r>
-            <a:r>
-              <a:rPr lang="nb-NO" sz="1400" dirty="0"/>
-              <a:t> </a:t>
-            </a:r>
-            <a:r>
-              <a:rPr lang="nb-NO" sz="1400" dirty="0" err="1"/>
-              <a:t>added</a:t>
-            </a:r>
-            <a:r>
-              <a:rPr lang="nb-NO" sz="1400" dirty="0"/>
-              <a:t> </a:t>
-            </a:r>
-            <a:r>
-              <a:rPr lang="nb-NO" sz="1400" dirty="0" err="1"/>
-              <a:t>products</a:t>
-            </a:r>
-            <a:endParaRPr lang="nb-NO" sz="1400" dirty="0"/>
-          </a:p>
-        </p:txBody>
-      </p:sp>
-      <p:sp>
-        <p:nvSpPr>
-          <p:cNvPr id="14" name="Rektangel 13">
-            <a:extLst>
-              <a:ext uri="{FF2B5EF4-FFF2-40B4-BE49-F238E27FC236}">
-                <a16:creationId xmlns:a16="http://schemas.microsoft.com/office/drawing/2014/main" id="{04B4F306-972D-B842-A126-77CA58303FE3}"/>
-              </a:ext>
-            </a:extLst>
-          </p:cNvPr>
-          <p:cNvSpPr/>
-          <p:nvPr/>
-        </p:nvSpPr>
-        <p:spPr>
-          <a:xfrm>
-            <a:off x="5656943" y="2476500"/>
-            <a:ext cx="2095500" cy="547497"/>
-          </a:xfrm>
-          <a:prstGeom prst="rect">
-            <a:avLst/>
-          </a:prstGeom>
-          <a:solidFill>
-            <a:schemeClr val="accent5"/>
-          </a:solidFill>
-        </p:spPr>
-        <p:style>
-          <a:lnRef idx="1">
-            <a:schemeClr val="accent4"/>
-          </a:lnRef>
-          <a:fillRef idx="2">
-            <a:schemeClr val="accent4"/>
-          </a:fillRef>
-          <a:effectRef idx="1">
-            <a:schemeClr val="accent4"/>
-          </a:effectRef>
-          <a:fontRef idx="minor">
-            <a:schemeClr val="dk1"/>
-          </a:fontRef>
-        </p:style>
-        <p:txBody>
-          <a:bodyPr rtlCol="0" anchor="t" anchorCtr="0"/>
-          <a:lstStyle/>
-          <a:p>
-            <a:pPr algn="ctr"/>
-            <a:r>
-              <a:rPr lang="nb-NO" sz="1400" dirty="0" err="1"/>
-              <a:t>Add</a:t>
-            </a:r>
-            <a:r>
-              <a:rPr lang="nb-NO" sz="1400" dirty="0"/>
-              <a:t> </a:t>
-            </a:r>
-            <a:r>
-              <a:rPr lang="nb-NO" sz="1400" dirty="0" err="1"/>
-              <a:t>new</a:t>
-            </a:r>
-            <a:r>
-              <a:rPr lang="nb-NO" sz="1400" dirty="0"/>
-              <a:t> order </a:t>
-            </a:r>
-            <a:r>
-              <a:rPr lang="nb-NO" sz="1400" dirty="0" err="1"/>
-              <a:t>only</a:t>
-            </a:r>
-            <a:r>
-              <a:rPr lang="nb-NO" sz="1400" dirty="0"/>
-              <a:t> </a:t>
-            </a:r>
-            <a:r>
-              <a:rPr lang="nb-NO" sz="1400" dirty="0" err="1"/>
-              <a:t>with</a:t>
-            </a:r>
-            <a:r>
-              <a:rPr lang="nb-NO" sz="1400" dirty="0"/>
-              <a:t> </a:t>
-            </a:r>
-            <a:r>
-              <a:rPr lang="nb-NO" sz="1400" dirty="0" err="1"/>
-              <a:t>new</a:t>
-            </a:r>
-            <a:r>
-              <a:rPr lang="nb-NO" sz="1400" dirty="0"/>
-              <a:t> </a:t>
-            </a:r>
-            <a:r>
-              <a:rPr lang="nb-NO" sz="1400" dirty="0" err="1"/>
-              <a:t>products</a:t>
-            </a:r>
-            <a:endParaRPr lang="nb-NO" sz="1400" dirty="0"/>
-          </a:p>
-        </p:txBody>
-      </p:sp>
-      <p:sp>
-        <p:nvSpPr>
-          <p:cNvPr id="16" name="TekstSylinder 15">
-            <a:extLst>
-              <a:ext uri="{FF2B5EF4-FFF2-40B4-BE49-F238E27FC236}">
-                <a16:creationId xmlns:a16="http://schemas.microsoft.com/office/drawing/2014/main" id="{7C93C973-59C3-094E-8F58-808E5D99C671}"/>
-              </a:ext>
-            </a:extLst>
-          </p:cNvPr>
-          <p:cNvSpPr txBox="1"/>
-          <p:nvPr/>
-        </p:nvSpPr>
-        <p:spPr>
-          <a:xfrm>
-            <a:off x="2879812" y="3893431"/>
-            <a:ext cx="2561920" cy="307777"/>
-          </a:xfrm>
-          <a:prstGeom prst="rect">
-            <a:avLst/>
-          </a:prstGeom>
-          <a:noFill/>
-        </p:spPr>
-        <p:txBody>
-          <a:bodyPr wrap="none" rtlCol="0">
-            <a:spAutoFit/>
-          </a:bodyPr>
-          <a:lstStyle/>
-          <a:p>
-            <a:r>
-              <a:rPr lang="nb-NO" sz="1400" dirty="0" err="1"/>
-              <a:t>Changed</a:t>
-            </a:r>
-            <a:r>
-              <a:rPr lang="nb-NO" sz="1400" dirty="0"/>
-              <a:t> or </a:t>
-            </a:r>
-            <a:r>
-              <a:rPr lang="nb-NO" sz="1400" dirty="0" err="1"/>
-              <a:t>removed</a:t>
-            </a:r>
-            <a:r>
-              <a:rPr lang="nb-NO" sz="1400" dirty="0"/>
-              <a:t> </a:t>
-            </a:r>
-            <a:r>
-              <a:rPr lang="nb-NO" sz="1400" dirty="0" err="1"/>
-              <a:t>products</a:t>
-            </a:r>
-            <a:r>
-              <a:rPr lang="nb-NO" sz="1400" dirty="0"/>
-              <a:t>?</a:t>
-            </a:r>
-          </a:p>
-        </p:txBody>
-      </p:sp>
-      <p:cxnSp>
-        <p:nvCxnSpPr>
-          <p:cNvPr id="17" name="Rett pil 16">
-            <a:extLst>
-              <a:ext uri="{FF2B5EF4-FFF2-40B4-BE49-F238E27FC236}">
-                <a16:creationId xmlns:a16="http://schemas.microsoft.com/office/drawing/2014/main" id="{D2D1810A-0757-5D4A-B2EB-AD93B0A4E467}"/>
-              </a:ext>
-            </a:extLst>
-          </p:cNvPr>
-          <p:cNvCxnSpPr>
-            <a:cxnSpLocks/>
-          </p:cNvCxnSpPr>
-          <p:nvPr/>
-        </p:nvCxnSpPr>
-        <p:spPr>
-          <a:xfrm>
-            <a:off x="2933700" y="4229100"/>
-            <a:ext cx="2438400" cy="0"/>
-          </a:xfrm>
-          <a:prstGeom prst="straightConnector1">
-            <a:avLst/>
-          </a:prstGeom>
-          <a:ln>
-            <a:tailEnd type="triangle"/>
-          </a:ln>
-        </p:spPr>
-        <p:style>
-          <a:lnRef idx="1">
-            <a:schemeClr val="accent1"/>
-          </a:lnRef>
-          <a:fillRef idx="0">
-            <a:schemeClr val="accent1"/>
-          </a:fillRef>
-          <a:effectRef idx="0">
-            <a:schemeClr val="accent1"/>
-          </a:effectRef>
-          <a:fontRef idx="minor">
-            <a:schemeClr val="tx1"/>
-          </a:fontRef>
-        </p:style>
-      </p:cxnSp>
-      <p:sp>
-        <p:nvSpPr>
-          <p:cNvPr id="18" name="Rektangel 17">
-            <a:extLst>
-              <a:ext uri="{FF2B5EF4-FFF2-40B4-BE49-F238E27FC236}">
-                <a16:creationId xmlns:a16="http://schemas.microsoft.com/office/drawing/2014/main" id="{E93CEE24-AE56-7043-BE06-8A428CC7EF60}"/>
-              </a:ext>
-            </a:extLst>
-          </p:cNvPr>
-          <p:cNvSpPr/>
-          <p:nvPr/>
-        </p:nvSpPr>
-        <p:spPr>
-          <a:xfrm>
-            <a:off x="5898243" y="4051300"/>
-            <a:ext cx="2095500" cy="547497"/>
-          </a:xfrm>
-          <a:prstGeom prst="rect">
-            <a:avLst/>
-          </a:prstGeom>
-          <a:solidFill>
-            <a:schemeClr val="accent5"/>
-          </a:solidFill>
-        </p:spPr>
-        <p:style>
-          <a:lnRef idx="1">
-            <a:schemeClr val="accent4"/>
-          </a:lnRef>
-          <a:fillRef idx="2">
-            <a:schemeClr val="accent4"/>
-          </a:fillRef>
-          <a:effectRef idx="1">
-            <a:schemeClr val="accent4"/>
-          </a:effectRef>
-          <a:fontRef idx="minor">
-            <a:schemeClr val="dk1"/>
-          </a:fontRef>
-        </p:style>
-        <p:txBody>
-          <a:bodyPr rtlCol="0" anchor="t" anchorCtr="0"/>
-          <a:lstStyle/>
-          <a:p>
-            <a:pPr algn="ctr"/>
-            <a:r>
-              <a:rPr lang="nb-NO" sz="1400" dirty="0" err="1"/>
-              <a:t>Cancel</a:t>
-            </a:r>
-            <a:r>
-              <a:rPr lang="nb-NO" sz="1400" dirty="0"/>
-              <a:t> and </a:t>
-            </a:r>
-            <a:r>
-              <a:rPr lang="nb-NO" sz="1400" dirty="0" err="1"/>
-              <a:t>refund</a:t>
-            </a:r>
-            <a:r>
-              <a:rPr lang="nb-NO" sz="1400" dirty="0"/>
-              <a:t> </a:t>
-            </a:r>
-            <a:r>
-              <a:rPr lang="nb-NO" sz="1400" dirty="0" err="1"/>
-              <a:t>old</a:t>
-            </a:r>
-            <a:r>
-              <a:rPr lang="nb-NO" sz="1400" dirty="0"/>
-              <a:t> order</a:t>
-            </a:r>
-          </a:p>
-        </p:txBody>
-      </p:sp>
-      <p:sp>
-        <p:nvSpPr>
-          <p:cNvPr id="19" name="Rektangel 18">
-            <a:extLst>
-              <a:ext uri="{FF2B5EF4-FFF2-40B4-BE49-F238E27FC236}">
-                <a16:creationId xmlns:a16="http://schemas.microsoft.com/office/drawing/2014/main" id="{FBC2FA73-955F-D74A-8C38-097014AE0360}"/>
-              </a:ext>
-            </a:extLst>
-          </p:cNvPr>
-          <p:cNvSpPr/>
-          <p:nvPr/>
-        </p:nvSpPr>
-        <p:spPr>
-          <a:xfrm>
-            <a:off x="8100054" y="4051300"/>
-            <a:ext cx="2095500" cy="547497"/>
-          </a:xfrm>
-          <a:prstGeom prst="rect">
-            <a:avLst/>
-          </a:prstGeom>
-          <a:solidFill>
-            <a:schemeClr val="accent5"/>
-          </a:solidFill>
-        </p:spPr>
-        <p:style>
-          <a:lnRef idx="1">
-            <a:schemeClr val="accent4"/>
-          </a:lnRef>
-          <a:fillRef idx="2">
-            <a:schemeClr val="accent4"/>
-          </a:fillRef>
-          <a:effectRef idx="1">
-            <a:schemeClr val="accent4"/>
-          </a:effectRef>
-          <a:fontRef idx="minor">
-            <a:schemeClr val="dk1"/>
-          </a:fontRef>
-        </p:style>
-        <p:txBody>
-          <a:bodyPr rtlCol="0" anchor="t" anchorCtr="0"/>
-          <a:lstStyle/>
-          <a:p>
-            <a:pPr algn="ctr"/>
-            <a:r>
-              <a:rPr lang="nb-NO" sz="1400" dirty="0" err="1"/>
-              <a:t>Create</a:t>
-            </a:r>
-            <a:r>
-              <a:rPr lang="nb-NO" sz="1400" dirty="0"/>
-              <a:t> </a:t>
-            </a:r>
-            <a:r>
-              <a:rPr lang="nb-NO" sz="1400" dirty="0" err="1"/>
-              <a:t>new</a:t>
-            </a:r>
-            <a:r>
-              <a:rPr lang="nb-NO" sz="1400" dirty="0"/>
-              <a:t> order </a:t>
-            </a:r>
-            <a:r>
-              <a:rPr lang="nb-NO" sz="1400" dirty="0" err="1"/>
-              <a:t>with</a:t>
-            </a:r>
-            <a:r>
-              <a:rPr lang="nb-NO" sz="1400" dirty="0"/>
-              <a:t> </a:t>
-            </a:r>
-            <a:r>
-              <a:rPr lang="nb-NO" sz="1400" dirty="0" err="1"/>
-              <a:t>reference</a:t>
-            </a:r>
-            <a:r>
-              <a:rPr lang="nb-NO" sz="1400" dirty="0"/>
-              <a:t> to </a:t>
-            </a:r>
-            <a:r>
-              <a:rPr lang="nb-NO" sz="1400" dirty="0" err="1"/>
-              <a:t>the</a:t>
-            </a:r>
-            <a:r>
-              <a:rPr lang="nb-NO" sz="1400" dirty="0"/>
-              <a:t> </a:t>
-            </a:r>
-            <a:r>
-              <a:rPr lang="nb-NO" sz="1400" dirty="0" err="1"/>
-              <a:t>old</a:t>
-            </a:r>
-            <a:r>
-              <a:rPr lang="nb-NO" sz="1400" dirty="0"/>
-              <a:t> </a:t>
-            </a:r>
-            <a:r>
-              <a:rPr lang="nb-NO" sz="1400" dirty="0" err="1"/>
-              <a:t>one</a:t>
-            </a:r>
-            <a:r>
-              <a:rPr lang="nb-NO" sz="1400" dirty="0"/>
-              <a:t>. </a:t>
-            </a:r>
-          </a:p>
-        </p:txBody>
-      </p:sp>
-    </p:spTree>
-    <p:extLst>
-      <p:ext uri="{BB962C8B-B14F-4D97-AF65-F5344CB8AC3E}">
-        <p14:creationId xmlns:p14="http://schemas.microsoft.com/office/powerpoint/2010/main" val="1958658533"/>
-      </p:ext>
-    </p:extLst>
-  </p:cSld>
-  <p:clrMapOvr>
-    <a:masterClrMapping/>
-  </p:clrMapOvr>
-</p:sld>
-</file>
-
-<file path=ppt/slides/slide5.xml><?xml version="1.0" encoding="utf-8"?>
 <p:sld xmlns:a="http://schemas.openxmlformats.org/drawingml/2006/main" xmlns:r="http://schemas.openxmlformats.org/officeDocument/2006/relationships" xmlns:p="http://schemas.openxmlformats.org/presentationml/2006/main">
   <p:cSld>
     <p:spTree>
@@ -5832,28 +3762,23 @@
           <a:lstStyle/>
           <a:p>
             <a:r>
-              <a:rPr lang="en-US" dirty="0"/>
+              <a:rPr lang="en-US"/>
               <a:t>User registers, mandatory and optional </a:t>
             </a:r>
             <a:br>
-              <a:rPr lang="en-US" dirty="0"/>
+              <a:rPr lang="en-US"/>
             </a:br>
             <a:r>
-              <a:rPr lang="en-US" dirty="0"/>
-              <a:t>products/</a:t>
-            </a:r>
-            <a:r>
-              <a:rPr lang="en-US" dirty="0" err="1"/>
-              <a:t>productvariants</a:t>
-            </a:r>
-            <a:r>
-              <a:rPr lang="en-US" dirty="0"/>
-              <a:t> are stored as</a:t>
+              <a:rPr lang="en-US"/>
+              <a:t>products/productvariants are stored as</a:t>
             </a:r>
             <a:br>
-              <a:rPr lang="en-US" dirty="0"/>
+              <a:rPr lang="en-US"/>
             </a:br>
-            <a:endParaRPr lang="en-US" dirty="0"/>
+            <a:r>
+              <a:rPr lang="en-US"/>
+              <a:t>registrationoptions</a:t>
+            </a:r>
           </a:p>
         </p:txBody>
       </p:sp>
@@ -6011,29 +3936,29 @@
           <a:lstStyle/>
           <a:p>
             <a:r>
-              <a:rPr lang="en-US" dirty="0"/>
+              <a:rPr lang="en-US"/>
               <a:t>After the event a new order is </a:t>
             </a:r>
             <a:br>
-              <a:rPr lang="en-US" dirty="0"/>
+              <a:rPr lang="en-US"/>
             </a:br>
             <a:r>
-              <a:rPr lang="en-US" dirty="0"/>
+              <a:rPr lang="en-US"/>
               <a:t>created if there is a difference</a:t>
             </a:r>
             <a:br>
-              <a:rPr lang="en-US" dirty="0"/>
+              <a:rPr lang="en-US"/>
             </a:br>
             <a:r>
-              <a:rPr lang="en-US" dirty="0"/>
+              <a:rPr lang="en-US"/>
               <a:t>between invoiced order #1</a:t>
             </a:r>
             <a:br>
-              <a:rPr lang="en-US" dirty="0"/>
+              <a:rPr lang="en-US"/>
             </a:br>
             <a:r>
-              <a:rPr lang="en-US" dirty="0"/>
-              <a:t>and actual registered products</a:t>
+              <a:rPr lang="en-US"/>
+              <a:t>and actual registration options</a:t>
             </a:r>
           </a:p>
         </p:txBody>

</xml_diff>